<commit_message>
Class Practice- CSB (03-08-2023)
</commit_message>
<xml_diff>
--- a/Lecture- Slides/Lecture01.pptx
+++ b/Lecture- Slides/Lecture01.pptx
@@ -258,7 +258,7 @@
           <a:p>
             <a:fld id="{1A505C8B-77AC-4741-A9A7-8CC75ECBA31A}" type="datetimeFigureOut">
               <a:rPr lang="en-US" smtClean="0"/>
-              <a:t>3/7/2023</a:t>
+              <a:t>3/8/2023</a:t>
             </a:fld>
             <a:endParaRPr lang="en-US"/>
           </a:p>
@@ -428,7 +428,7 @@
           <a:p>
             <a:fld id="{1A505C8B-77AC-4741-A9A7-8CC75ECBA31A}" type="datetimeFigureOut">
               <a:rPr lang="en-US" smtClean="0"/>
-              <a:t>3/7/2023</a:t>
+              <a:t>3/8/2023</a:t>
             </a:fld>
             <a:endParaRPr lang="en-US"/>
           </a:p>
@@ -608,7 +608,7 @@
           <a:p>
             <a:fld id="{1A505C8B-77AC-4741-A9A7-8CC75ECBA31A}" type="datetimeFigureOut">
               <a:rPr lang="en-US" smtClean="0"/>
-              <a:t>3/7/2023</a:t>
+              <a:t>3/8/2023</a:t>
             </a:fld>
             <a:endParaRPr lang="en-US"/>
           </a:p>
@@ -778,7 +778,7 @@
           <a:p>
             <a:fld id="{1A505C8B-77AC-4741-A9A7-8CC75ECBA31A}" type="datetimeFigureOut">
               <a:rPr lang="en-US" smtClean="0"/>
-              <a:t>3/7/2023</a:t>
+              <a:t>3/8/2023</a:t>
             </a:fld>
             <a:endParaRPr lang="en-US"/>
           </a:p>
@@ -1024,7 +1024,7 @@
           <a:p>
             <a:fld id="{1A505C8B-77AC-4741-A9A7-8CC75ECBA31A}" type="datetimeFigureOut">
               <a:rPr lang="en-US" smtClean="0"/>
-              <a:t>3/7/2023</a:t>
+              <a:t>3/8/2023</a:t>
             </a:fld>
             <a:endParaRPr lang="en-US"/>
           </a:p>
@@ -1256,7 +1256,7 @@
           <a:p>
             <a:fld id="{1A505C8B-77AC-4741-A9A7-8CC75ECBA31A}" type="datetimeFigureOut">
               <a:rPr lang="en-US" smtClean="0"/>
-              <a:t>3/7/2023</a:t>
+              <a:t>3/8/2023</a:t>
             </a:fld>
             <a:endParaRPr lang="en-US"/>
           </a:p>
@@ -1623,7 +1623,7 @@
           <a:p>
             <a:fld id="{1A505C8B-77AC-4741-A9A7-8CC75ECBA31A}" type="datetimeFigureOut">
               <a:rPr lang="en-US" smtClean="0"/>
-              <a:t>3/7/2023</a:t>
+              <a:t>3/8/2023</a:t>
             </a:fld>
             <a:endParaRPr lang="en-US"/>
           </a:p>
@@ -1741,7 +1741,7 @@
           <a:p>
             <a:fld id="{1A505C8B-77AC-4741-A9A7-8CC75ECBA31A}" type="datetimeFigureOut">
               <a:rPr lang="en-US" smtClean="0"/>
-              <a:t>3/7/2023</a:t>
+              <a:t>3/8/2023</a:t>
             </a:fld>
             <a:endParaRPr lang="en-US"/>
           </a:p>
@@ -1836,7 +1836,7 @@
           <a:p>
             <a:fld id="{1A505C8B-77AC-4741-A9A7-8CC75ECBA31A}" type="datetimeFigureOut">
               <a:rPr lang="en-US" smtClean="0"/>
-              <a:t>3/7/2023</a:t>
+              <a:t>3/8/2023</a:t>
             </a:fld>
             <a:endParaRPr lang="en-US"/>
           </a:p>
@@ -2113,7 +2113,7 @@
           <a:p>
             <a:fld id="{1A505C8B-77AC-4741-A9A7-8CC75ECBA31A}" type="datetimeFigureOut">
               <a:rPr lang="en-US" smtClean="0"/>
-              <a:t>3/7/2023</a:t>
+              <a:t>3/8/2023</a:t>
             </a:fld>
             <a:endParaRPr lang="en-US"/>
           </a:p>
@@ -2366,7 +2366,7 @@
           <a:p>
             <a:fld id="{1A505C8B-77AC-4741-A9A7-8CC75ECBA31A}" type="datetimeFigureOut">
               <a:rPr lang="en-US" smtClean="0"/>
-              <a:t>3/7/2023</a:t>
+              <a:t>3/8/2023</a:t>
             </a:fld>
             <a:endParaRPr lang="en-US"/>
           </a:p>
@@ -2579,7 +2579,7 @@
           <a:p>
             <a:fld id="{1A505C8B-77AC-4741-A9A7-8CC75ECBA31A}" type="datetimeFigureOut">
               <a:rPr lang="en-US" smtClean="0"/>
-              <a:t>3/7/2023</a:t>
+              <a:t>3/8/2023</a:t>
             </a:fld>
             <a:endParaRPr lang="en-US"/>
           </a:p>
@@ -3084,7 +3084,43 @@
               <a:rPr lang="en-GB" dirty="0" smtClean="0"/>
               <a:t>Reduce</a:t>
             </a:r>
-            <a:endParaRPr lang="en-US" sz="2000" dirty="0" smtClean="0">
+          </a:p>
+          <a:p>
+            <a:pPr lvl="1"/>
+            <a:r>
+              <a:rPr lang="en-GB" sz="1600" dirty="0" err="1" smtClean="0">
+                <a:solidFill>
+                  <a:schemeClr val="accent6">
+                    <a:lumMod val="50000"/>
+                  </a:schemeClr>
+                </a:solidFill>
+              </a:rPr>
+              <a:t>Arr.reduce</a:t>
+            </a:r>
+            <a:r>
+              <a:rPr lang="en-GB" sz="1600" dirty="0" smtClean="0">
+                <a:solidFill>
+                  <a:schemeClr val="accent6">
+                    <a:lumMod val="50000"/>
+                  </a:schemeClr>
+                </a:solidFill>
+              </a:rPr>
+              <a:t>( function, initial value)</a:t>
+            </a:r>
+          </a:p>
+          <a:p>
+            <a:pPr lvl="1"/>
+            <a:r>
+              <a:rPr lang="en-GB" sz="1600" dirty="0" smtClean="0">
+                <a:solidFill>
+                  <a:schemeClr val="accent6">
+                    <a:lumMod val="50000"/>
+                  </a:schemeClr>
+                </a:solidFill>
+              </a:rPr>
+              <a:t>Return a single</a:t>
+            </a:r>
+            <a:endParaRPr lang="en-US" sz="1600" dirty="0" smtClean="0">
               <a:solidFill>
                 <a:schemeClr val="accent6">
                   <a:lumMod val="50000"/>
@@ -3983,24 +4019,37 @@
           <a:lstStyle/>
           <a:p>
             <a:r>
-              <a:rPr lang="en-US">
+              <a:rPr lang="en-US" dirty="0">
                 <a:hlinkClick r:id="rId2"/>
               </a:rPr>
-              <a:t>https</a:t>
-            </a:r>
-            <a:r>
-              <a:rPr lang="en-US">
-                <a:hlinkClick r:id="rId2"/>
-              </a:rPr>
-              <a:t>://</a:t>
-            </a:r>
-            <a:r>
-              <a:rPr lang="en-US" smtClean="0">
+              <a:t>https://</a:t>
+            </a:r>
+            <a:r>
+              <a:rPr lang="en-US" dirty="0" smtClean="0">
                 <a:hlinkClick r:id="rId2"/>
               </a:rPr>
               <a:t>www.w3schools.com/js/default.asp</a:t>
             </a:r>
-            <a:endParaRPr lang="en-US" smtClean="0"/>
+            <a:endParaRPr lang="en-US" dirty="0" smtClean="0"/>
+          </a:p>
+          <a:p>
+            <a:r>
+              <a:rPr lang="en-US" dirty="0">
+                <a:hlinkClick r:id="rId3"/>
+              </a:rPr>
+              <a:t>https://</a:t>
+            </a:r>
+            <a:r>
+              <a:rPr lang="en-US" dirty="0" smtClean="0">
+                <a:hlinkClick r:id="rId3"/>
+              </a:rPr>
+              <a:t>developer.mozilla.org/en-US/docs/Web/JavaScript</a:t>
+            </a:r>
+            <a:r>
+              <a:rPr lang="en-US" dirty="0" smtClean="0"/>
+              <a:t> </a:t>
+            </a:r>
+            <a:endParaRPr lang="en-US" dirty="0" smtClean="0"/>
           </a:p>
           <a:p>
             <a:endParaRPr lang="en-US" dirty="0"/>

</xml_diff>